<commit_message>
lec1 almost done. some readings over
</commit_message>
<xml_diff>
--- a/dapr3_lectures/dapr3_lmer_lec/img_sandbox/ssvenn.pptx
+++ b/dapr3_lectures/dapr3_lmer_lec/img_sandbox/ssvenn.pptx
@@ -14,6 +14,7 @@
     <p:sldId id="263" r:id="rId8"/>
     <p:sldId id="265" r:id="rId9"/>
     <p:sldId id="266" r:id="rId10"/>
+    <p:sldId id="267" r:id="rId11"/>
   </p:sldIdLst>
   <p:sldSz cx="5400675" cy="5400675"/>
   <p:notesSz cx="6858000" cy="9144000"/>
@@ -251,7 +252,7 @@
           <a:p>
             <a:fld id="{ADBDF324-CFA2-4D7F-9A02-796BD83E262C}" type="datetimeFigureOut">
               <a:rPr lang="en-GB" smtClean="0"/>
-              <a:t>10/06/2024</a:t>
+              <a:t>27/06/2024</a:t>
             </a:fld>
             <a:endParaRPr lang="en-GB"/>
           </a:p>
@@ -421,7 +422,7 @@
           <a:p>
             <a:fld id="{ADBDF324-CFA2-4D7F-9A02-796BD83E262C}" type="datetimeFigureOut">
               <a:rPr lang="en-GB" smtClean="0"/>
-              <a:t>10/06/2024</a:t>
+              <a:t>27/06/2024</a:t>
             </a:fld>
             <a:endParaRPr lang="en-GB"/>
           </a:p>
@@ -601,7 +602,7 @@
           <a:p>
             <a:fld id="{ADBDF324-CFA2-4D7F-9A02-796BD83E262C}" type="datetimeFigureOut">
               <a:rPr lang="en-GB" smtClean="0"/>
-              <a:t>10/06/2024</a:t>
+              <a:t>27/06/2024</a:t>
             </a:fld>
             <a:endParaRPr lang="en-GB"/>
           </a:p>
@@ -771,7 +772,7 @@
           <a:p>
             <a:fld id="{ADBDF324-CFA2-4D7F-9A02-796BD83E262C}" type="datetimeFigureOut">
               <a:rPr lang="en-GB" smtClean="0"/>
-              <a:t>10/06/2024</a:t>
+              <a:t>27/06/2024</a:t>
             </a:fld>
             <a:endParaRPr lang="en-GB"/>
           </a:p>
@@ -1015,7 +1016,7 @@
           <a:p>
             <a:fld id="{ADBDF324-CFA2-4D7F-9A02-796BD83E262C}" type="datetimeFigureOut">
               <a:rPr lang="en-GB" smtClean="0"/>
-              <a:t>10/06/2024</a:t>
+              <a:t>27/06/2024</a:t>
             </a:fld>
             <a:endParaRPr lang="en-GB"/>
           </a:p>
@@ -1247,7 +1248,7 @@
           <a:p>
             <a:fld id="{ADBDF324-CFA2-4D7F-9A02-796BD83E262C}" type="datetimeFigureOut">
               <a:rPr lang="en-GB" smtClean="0"/>
-              <a:t>10/06/2024</a:t>
+              <a:t>27/06/2024</a:t>
             </a:fld>
             <a:endParaRPr lang="en-GB"/>
           </a:p>
@@ -1614,7 +1615,7 @@
           <a:p>
             <a:fld id="{ADBDF324-CFA2-4D7F-9A02-796BD83E262C}" type="datetimeFigureOut">
               <a:rPr lang="en-GB" smtClean="0"/>
-              <a:t>10/06/2024</a:t>
+              <a:t>27/06/2024</a:t>
             </a:fld>
             <a:endParaRPr lang="en-GB"/>
           </a:p>
@@ -1732,7 +1733,7 @@
           <a:p>
             <a:fld id="{ADBDF324-CFA2-4D7F-9A02-796BD83E262C}" type="datetimeFigureOut">
               <a:rPr lang="en-GB" smtClean="0"/>
-              <a:t>10/06/2024</a:t>
+              <a:t>27/06/2024</a:t>
             </a:fld>
             <a:endParaRPr lang="en-GB"/>
           </a:p>
@@ -1827,7 +1828,7 @@
           <a:p>
             <a:fld id="{ADBDF324-CFA2-4D7F-9A02-796BD83E262C}" type="datetimeFigureOut">
               <a:rPr lang="en-GB" smtClean="0"/>
-              <a:t>10/06/2024</a:t>
+              <a:t>27/06/2024</a:t>
             </a:fld>
             <a:endParaRPr lang="en-GB"/>
           </a:p>
@@ -2104,7 +2105,7 @@
           <a:p>
             <a:fld id="{ADBDF324-CFA2-4D7F-9A02-796BD83E262C}" type="datetimeFigureOut">
               <a:rPr lang="en-GB" smtClean="0"/>
-              <a:t>10/06/2024</a:t>
+              <a:t>27/06/2024</a:t>
             </a:fld>
             <a:endParaRPr lang="en-GB"/>
           </a:p>
@@ -2361,7 +2362,7 @@
           <a:p>
             <a:fld id="{ADBDF324-CFA2-4D7F-9A02-796BD83E262C}" type="datetimeFigureOut">
               <a:rPr lang="en-GB" smtClean="0"/>
-              <a:t>10/06/2024</a:t>
+              <a:t>27/06/2024</a:t>
             </a:fld>
             <a:endParaRPr lang="en-GB"/>
           </a:p>
@@ -2574,7 +2575,7 @@
           <a:p>
             <a:fld id="{ADBDF324-CFA2-4D7F-9A02-796BD83E262C}" type="datetimeFigureOut">
               <a:rPr lang="en-GB" smtClean="0"/>
-              <a:t>10/06/2024</a:t>
+              <a:t>27/06/2024</a:t>
             </a:fld>
             <a:endParaRPr lang="en-GB"/>
           </a:p>
@@ -3050,6 +3051,985 @@
 </p:sld>
 </file>
 
+<file path=ppt/slides/slide10.xml><?xml version="1.0" encoding="utf-8"?>
+<p:sld xmlns:a="http://schemas.openxmlformats.org/drawingml/2006/main" xmlns:r="http://schemas.openxmlformats.org/officeDocument/2006/relationships" xmlns:p="http://schemas.openxmlformats.org/presentationml/2006/main">
+  <p:cSld>
+    <p:spTree>
+      <p:nvGrpSpPr>
+        <p:cNvPr id="1" name=""/>
+        <p:cNvGrpSpPr/>
+        <p:nvPr/>
+      </p:nvGrpSpPr>
+      <p:grpSpPr>
+        <a:xfrm>
+          <a:off x="0" y="0"/>
+          <a:ext cx="0" cy="0"/>
+          <a:chOff x="0" y="0"/>
+          <a:chExt cx="0" cy="0"/>
+        </a:xfrm>
+      </p:grpSpPr>
+      <p:grpSp>
+        <p:nvGrpSpPr>
+          <p:cNvPr id="2" name="Group 1">
+            <a:extLst>
+              <a:ext uri="{FF2B5EF4-FFF2-40B4-BE49-F238E27FC236}">
+                <a16:creationId xmlns:a16="http://schemas.microsoft.com/office/drawing/2014/main" id="{9C87D3E3-643F-4592-8C54-76237F77F31B}"/>
+              </a:ext>
+            </a:extLst>
+          </p:cNvPr>
+          <p:cNvGrpSpPr/>
+          <p:nvPr/>
+        </p:nvGrpSpPr>
+        <p:grpSpPr>
+          <a:xfrm>
+            <a:off x="294679" y="187587"/>
+            <a:ext cx="2340310" cy="2005842"/>
+            <a:chOff x="615052" y="381480"/>
+            <a:chExt cx="4237315" cy="3631734"/>
+          </a:xfrm>
+        </p:grpSpPr>
+        <p:sp>
+          <p:nvSpPr>
+            <p:cNvPr id="5" name="Oval 4">
+              <a:extLst>
+                <a:ext uri="{FF2B5EF4-FFF2-40B4-BE49-F238E27FC236}">
+                  <a16:creationId xmlns:a16="http://schemas.microsoft.com/office/drawing/2014/main" id="{D967BF94-FC61-400B-B562-5FEBEE6EEB67}"/>
+                </a:ext>
+              </a:extLst>
+            </p:cNvPr>
+            <p:cNvSpPr/>
+            <p:nvPr/>
+          </p:nvSpPr>
+          <p:spPr>
+            <a:xfrm>
+              <a:off x="2226612" y="381480"/>
+              <a:ext cx="2625755" cy="2625755"/>
+            </a:xfrm>
+            <a:prstGeom prst="ellipse">
+              <a:avLst/>
+            </a:prstGeom>
+            <a:solidFill>
+              <a:srgbClr val="FFFF00">
+                <a:alpha val="50196"/>
+              </a:srgbClr>
+            </a:solidFill>
+          </p:spPr>
+          <p:style>
+            <a:lnRef idx="2">
+              <a:schemeClr val="accent1">
+                <a:shade val="50000"/>
+              </a:schemeClr>
+            </a:lnRef>
+            <a:fillRef idx="1">
+              <a:schemeClr val="accent1"/>
+            </a:fillRef>
+            <a:effectRef idx="0">
+              <a:schemeClr val="accent1"/>
+            </a:effectRef>
+            <a:fontRef idx="minor">
+              <a:schemeClr val="lt1"/>
+            </a:fontRef>
+          </p:style>
+          <p:txBody>
+            <a:bodyPr rtlCol="0" anchor="ctr"/>
+            <a:lstStyle/>
+            <a:p>
+              <a:pPr algn="ctr"/>
+              <a:r>
+                <a:rPr lang="en-GB" sz="2400" b="1" dirty="0">
+                  <a:solidFill>
+                    <a:schemeClr val="accent4"/>
+                  </a:solidFill>
+                </a:rPr>
+                <a:t>Y</a:t>
+              </a:r>
+            </a:p>
+          </p:txBody>
+        </p:sp>
+        <p:sp>
+          <p:nvSpPr>
+            <p:cNvPr id="8" name="Oval 7">
+              <a:extLst>
+                <a:ext uri="{FF2B5EF4-FFF2-40B4-BE49-F238E27FC236}">
+                  <a16:creationId xmlns:a16="http://schemas.microsoft.com/office/drawing/2014/main" id="{6B6C5899-89F2-4EB4-8F92-D65BD972076C}"/>
+                </a:ext>
+              </a:extLst>
+            </p:cNvPr>
+            <p:cNvSpPr/>
+            <p:nvPr/>
+          </p:nvSpPr>
+          <p:spPr>
+            <a:xfrm>
+              <a:off x="615052" y="1387460"/>
+              <a:ext cx="2625754" cy="2625754"/>
+            </a:xfrm>
+            <a:prstGeom prst="ellipse">
+              <a:avLst/>
+            </a:prstGeom>
+            <a:solidFill>
+              <a:srgbClr val="00B0F0">
+                <a:alpha val="50196"/>
+              </a:srgbClr>
+            </a:solidFill>
+          </p:spPr>
+          <p:style>
+            <a:lnRef idx="2">
+              <a:schemeClr val="accent1">
+                <a:shade val="50000"/>
+              </a:schemeClr>
+            </a:lnRef>
+            <a:fillRef idx="1">
+              <a:schemeClr val="accent1"/>
+            </a:fillRef>
+            <a:effectRef idx="0">
+              <a:schemeClr val="accent1"/>
+            </a:effectRef>
+            <a:fontRef idx="minor">
+              <a:schemeClr val="lt1"/>
+            </a:fontRef>
+          </p:style>
+          <p:txBody>
+            <a:bodyPr rtlCol="0" anchor="ctr"/>
+            <a:lstStyle/>
+            <a:p>
+              <a:pPr algn="ctr"/>
+              <a:r>
+                <a:rPr lang="en-GB" sz="2400" b="1" dirty="0">
+                  <a:solidFill>
+                    <a:schemeClr val="accent1"/>
+                  </a:solidFill>
+                </a:rPr>
+                <a:t>Z</a:t>
+              </a:r>
+            </a:p>
+          </p:txBody>
+        </p:sp>
+        <p:sp>
+          <p:nvSpPr>
+            <p:cNvPr id="9" name="TextBox 8">
+              <a:extLst>
+                <a:ext uri="{FF2B5EF4-FFF2-40B4-BE49-F238E27FC236}">
+                  <a16:creationId xmlns:a16="http://schemas.microsoft.com/office/drawing/2014/main" id="{9CD086AD-1B6B-4351-99A3-FB77B7BF5877}"/>
+                </a:ext>
+              </a:extLst>
+            </p:cNvPr>
+            <p:cNvSpPr txBox="1"/>
+            <p:nvPr/>
+          </p:nvSpPr>
+          <p:spPr>
+            <a:xfrm>
+              <a:off x="3391853" y="2450767"/>
+              <a:ext cx="334470" cy="835881"/>
+            </a:xfrm>
+            <a:prstGeom prst="rect">
+              <a:avLst/>
+            </a:prstGeom>
+            <a:noFill/>
+          </p:spPr>
+          <p:txBody>
+            <a:bodyPr wrap="none" rtlCol="0">
+              <a:spAutoFit/>
+            </a:bodyPr>
+            <a:lstStyle/>
+            <a:p>
+              <a:endParaRPr lang="en-GB" sz="2400" i="1" dirty="0"/>
+            </a:p>
+          </p:txBody>
+        </p:sp>
+        <p:sp>
+          <p:nvSpPr>
+            <p:cNvPr id="10" name="TextBox 9">
+              <a:extLst>
+                <a:ext uri="{FF2B5EF4-FFF2-40B4-BE49-F238E27FC236}">
+                  <a16:creationId xmlns:a16="http://schemas.microsoft.com/office/drawing/2014/main" id="{FA9C05CA-B254-4D00-9FF8-F3F58ECC597D}"/>
+                </a:ext>
+              </a:extLst>
+            </p:cNvPr>
+            <p:cNvSpPr txBox="1"/>
+            <p:nvPr/>
+          </p:nvSpPr>
+          <p:spPr>
+            <a:xfrm>
+              <a:off x="2839578" y="2389728"/>
+              <a:ext cx="334470" cy="835881"/>
+            </a:xfrm>
+            <a:prstGeom prst="rect">
+              <a:avLst/>
+            </a:prstGeom>
+            <a:noFill/>
+          </p:spPr>
+          <p:txBody>
+            <a:bodyPr wrap="none" rtlCol="0">
+              <a:spAutoFit/>
+            </a:bodyPr>
+            <a:lstStyle/>
+            <a:p>
+              <a:endParaRPr lang="en-GB" sz="2400" i="1" dirty="0"/>
+            </a:p>
+          </p:txBody>
+        </p:sp>
+        <p:sp>
+          <p:nvSpPr>
+            <p:cNvPr id="11" name="TextBox 10">
+              <a:extLst>
+                <a:ext uri="{FF2B5EF4-FFF2-40B4-BE49-F238E27FC236}">
+                  <a16:creationId xmlns:a16="http://schemas.microsoft.com/office/drawing/2014/main" id="{855F00A4-0AA9-4FFE-AE31-28CF47AA0F7D}"/>
+                </a:ext>
+              </a:extLst>
+            </p:cNvPr>
+            <p:cNvSpPr txBox="1"/>
+            <p:nvPr/>
+          </p:nvSpPr>
+          <p:spPr>
+            <a:xfrm>
+              <a:off x="2544305" y="1956890"/>
+              <a:ext cx="295275" cy="835881"/>
+            </a:xfrm>
+            <a:prstGeom prst="rect">
+              <a:avLst/>
+            </a:prstGeom>
+            <a:noFill/>
+          </p:spPr>
+          <p:txBody>
+            <a:bodyPr wrap="square" rtlCol="0">
+              <a:spAutoFit/>
+            </a:bodyPr>
+            <a:lstStyle/>
+            <a:p>
+              <a:endParaRPr lang="en-GB" sz="2400" i="1" dirty="0"/>
+            </a:p>
+          </p:txBody>
+        </p:sp>
+        <p:sp>
+          <p:nvSpPr>
+            <p:cNvPr id="12" name="TextBox 11">
+              <a:extLst>
+                <a:ext uri="{FF2B5EF4-FFF2-40B4-BE49-F238E27FC236}">
+                  <a16:creationId xmlns:a16="http://schemas.microsoft.com/office/drawing/2014/main" id="{04CE245B-AAD8-4472-9D38-3621B4818326}"/>
+                </a:ext>
+              </a:extLst>
+            </p:cNvPr>
+            <p:cNvSpPr txBox="1"/>
+            <p:nvPr/>
+          </p:nvSpPr>
+          <p:spPr>
+            <a:xfrm>
+              <a:off x="2533085" y="3018553"/>
+              <a:ext cx="334470" cy="835881"/>
+            </a:xfrm>
+            <a:prstGeom prst="rect">
+              <a:avLst/>
+            </a:prstGeom>
+            <a:noFill/>
+          </p:spPr>
+          <p:txBody>
+            <a:bodyPr wrap="none" rtlCol="0">
+              <a:spAutoFit/>
+            </a:bodyPr>
+            <a:lstStyle/>
+            <a:p>
+              <a:endParaRPr lang="en-GB" sz="2400" i="1" dirty="0"/>
+            </a:p>
+          </p:txBody>
+        </p:sp>
+        <p:sp>
+          <p:nvSpPr>
+            <p:cNvPr id="15" name="TextBox 14">
+              <a:extLst>
+                <a:ext uri="{FF2B5EF4-FFF2-40B4-BE49-F238E27FC236}">
+                  <a16:creationId xmlns:a16="http://schemas.microsoft.com/office/drawing/2014/main" id="{BFA5D737-B191-4CAA-B5C1-CF19ECC54EEB}"/>
+                </a:ext>
+              </a:extLst>
+            </p:cNvPr>
+            <p:cNvSpPr txBox="1"/>
+            <p:nvPr/>
+          </p:nvSpPr>
+          <p:spPr>
+            <a:xfrm>
+              <a:off x="3389449" y="451872"/>
+              <a:ext cx="334470" cy="835881"/>
+            </a:xfrm>
+            <a:prstGeom prst="rect">
+              <a:avLst/>
+            </a:prstGeom>
+            <a:noFill/>
+          </p:spPr>
+          <p:txBody>
+            <a:bodyPr wrap="none" rtlCol="0">
+              <a:spAutoFit/>
+            </a:bodyPr>
+            <a:lstStyle/>
+            <a:p>
+              <a:endParaRPr lang="en-GB" sz="2400" i="1" dirty="0"/>
+            </a:p>
+          </p:txBody>
+        </p:sp>
+      </p:grpSp>
+      <p:grpSp>
+        <p:nvGrpSpPr>
+          <p:cNvPr id="32" name="Group 31">
+            <a:extLst>
+              <a:ext uri="{FF2B5EF4-FFF2-40B4-BE49-F238E27FC236}">
+                <a16:creationId xmlns:a16="http://schemas.microsoft.com/office/drawing/2014/main" id="{0C8A1875-1AA6-4305-AB9E-6855F84FCB53}"/>
+              </a:ext>
+            </a:extLst>
+          </p:cNvPr>
+          <p:cNvGrpSpPr/>
+          <p:nvPr/>
+        </p:nvGrpSpPr>
+        <p:grpSpPr>
+          <a:xfrm>
+            <a:off x="294679" y="2829796"/>
+            <a:ext cx="2340310" cy="2422959"/>
+            <a:chOff x="615052" y="451872"/>
+            <a:chExt cx="4237315" cy="4386957"/>
+          </a:xfrm>
+        </p:grpSpPr>
+        <p:sp>
+          <p:nvSpPr>
+            <p:cNvPr id="34" name="Oval 33">
+              <a:extLst>
+                <a:ext uri="{FF2B5EF4-FFF2-40B4-BE49-F238E27FC236}">
+                  <a16:creationId xmlns:a16="http://schemas.microsoft.com/office/drawing/2014/main" id="{6F64A7BD-CAA6-45B7-88E5-1CCED908742A}"/>
+                </a:ext>
+              </a:extLst>
+            </p:cNvPr>
+            <p:cNvSpPr/>
+            <p:nvPr/>
+          </p:nvSpPr>
+          <p:spPr>
+            <a:xfrm>
+              <a:off x="2226613" y="2213075"/>
+              <a:ext cx="2625754" cy="2625754"/>
+            </a:xfrm>
+            <a:prstGeom prst="ellipse">
+              <a:avLst/>
+            </a:prstGeom>
+            <a:solidFill>
+              <a:srgbClr val="FF0000">
+                <a:alpha val="50196"/>
+              </a:srgbClr>
+            </a:solidFill>
+          </p:spPr>
+          <p:style>
+            <a:lnRef idx="2">
+              <a:schemeClr val="accent1">
+                <a:shade val="50000"/>
+              </a:schemeClr>
+            </a:lnRef>
+            <a:fillRef idx="1">
+              <a:schemeClr val="accent1"/>
+            </a:fillRef>
+            <a:effectRef idx="0">
+              <a:schemeClr val="accent1"/>
+            </a:effectRef>
+            <a:fontRef idx="minor">
+              <a:schemeClr val="lt1"/>
+            </a:fontRef>
+          </p:style>
+          <p:txBody>
+            <a:bodyPr rtlCol="0" anchor="ctr"/>
+            <a:lstStyle/>
+            <a:p>
+              <a:pPr algn="ctr"/>
+              <a:r>
+                <a:rPr lang="en-GB" sz="2400" b="1" dirty="0">
+                  <a:solidFill>
+                    <a:srgbClr val="C00000"/>
+                  </a:solidFill>
+                </a:rPr>
+                <a:t>X</a:t>
+              </a:r>
+            </a:p>
+          </p:txBody>
+        </p:sp>
+        <p:sp>
+          <p:nvSpPr>
+            <p:cNvPr id="35" name="Oval 34">
+              <a:extLst>
+                <a:ext uri="{FF2B5EF4-FFF2-40B4-BE49-F238E27FC236}">
+                  <a16:creationId xmlns:a16="http://schemas.microsoft.com/office/drawing/2014/main" id="{8973AA23-A573-45F4-897B-9EFAD276CD24}"/>
+                </a:ext>
+              </a:extLst>
+            </p:cNvPr>
+            <p:cNvSpPr/>
+            <p:nvPr/>
+          </p:nvSpPr>
+          <p:spPr>
+            <a:xfrm>
+              <a:off x="615052" y="1387460"/>
+              <a:ext cx="2625754" cy="2625754"/>
+            </a:xfrm>
+            <a:prstGeom prst="ellipse">
+              <a:avLst/>
+            </a:prstGeom>
+            <a:solidFill>
+              <a:srgbClr val="00B0F0">
+                <a:alpha val="50196"/>
+              </a:srgbClr>
+            </a:solidFill>
+          </p:spPr>
+          <p:style>
+            <a:lnRef idx="2">
+              <a:schemeClr val="accent1">
+                <a:shade val="50000"/>
+              </a:schemeClr>
+            </a:lnRef>
+            <a:fillRef idx="1">
+              <a:schemeClr val="accent1"/>
+            </a:fillRef>
+            <a:effectRef idx="0">
+              <a:schemeClr val="accent1"/>
+            </a:effectRef>
+            <a:fontRef idx="minor">
+              <a:schemeClr val="lt1"/>
+            </a:fontRef>
+          </p:style>
+          <p:txBody>
+            <a:bodyPr rtlCol="0" anchor="ctr"/>
+            <a:lstStyle/>
+            <a:p>
+              <a:pPr algn="ctr"/>
+              <a:r>
+                <a:rPr lang="en-GB" sz="2400" b="1" dirty="0">
+                  <a:solidFill>
+                    <a:schemeClr val="accent1"/>
+                  </a:solidFill>
+                </a:rPr>
+                <a:t>Z</a:t>
+              </a:r>
+            </a:p>
+          </p:txBody>
+        </p:sp>
+        <p:sp>
+          <p:nvSpPr>
+            <p:cNvPr id="36" name="TextBox 35">
+              <a:extLst>
+                <a:ext uri="{FF2B5EF4-FFF2-40B4-BE49-F238E27FC236}">
+                  <a16:creationId xmlns:a16="http://schemas.microsoft.com/office/drawing/2014/main" id="{325A01B3-8C3B-4096-AF91-A855ACD209F4}"/>
+                </a:ext>
+              </a:extLst>
+            </p:cNvPr>
+            <p:cNvSpPr txBox="1"/>
+            <p:nvPr/>
+          </p:nvSpPr>
+          <p:spPr>
+            <a:xfrm>
+              <a:off x="3391853" y="2450767"/>
+              <a:ext cx="334470" cy="835881"/>
+            </a:xfrm>
+            <a:prstGeom prst="rect">
+              <a:avLst/>
+            </a:prstGeom>
+            <a:noFill/>
+          </p:spPr>
+          <p:txBody>
+            <a:bodyPr wrap="none" rtlCol="0">
+              <a:spAutoFit/>
+            </a:bodyPr>
+            <a:lstStyle/>
+            <a:p>
+              <a:endParaRPr lang="en-GB" sz="2400" i="1" dirty="0"/>
+            </a:p>
+          </p:txBody>
+        </p:sp>
+        <p:sp>
+          <p:nvSpPr>
+            <p:cNvPr id="37" name="TextBox 36">
+              <a:extLst>
+                <a:ext uri="{FF2B5EF4-FFF2-40B4-BE49-F238E27FC236}">
+                  <a16:creationId xmlns:a16="http://schemas.microsoft.com/office/drawing/2014/main" id="{E7D42520-31BB-45E2-A447-64CC5707E6A4}"/>
+                </a:ext>
+              </a:extLst>
+            </p:cNvPr>
+            <p:cNvSpPr txBox="1"/>
+            <p:nvPr/>
+          </p:nvSpPr>
+          <p:spPr>
+            <a:xfrm>
+              <a:off x="2839578" y="2389728"/>
+              <a:ext cx="334470" cy="835881"/>
+            </a:xfrm>
+            <a:prstGeom prst="rect">
+              <a:avLst/>
+            </a:prstGeom>
+            <a:noFill/>
+          </p:spPr>
+          <p:txBody>
+            <a:bodyPr wrap="none" rtlCol="0">
+              <a:spAutoFit/>
+            </a:bodyPr>
+            <a:lstStyle/>
+            <a:p>
+              <a:endParaRPr lang="en-GB" sz="2400" i="1" dirty="0"/>
+            </a:p>
+          </p:txBody>
+        </p:sp>
+        <p:sp>
+          <p:nvSpPr>
+            <p:cNvPr id="38" name="TextBox 37">
+              <a:extLst>
+                <a:ext uri="{FF2B5EF4-FFF2-40B4-BE49-F238E27FC236}">
+                  <a16:creationId xmlns:a16="http://schemas.microsoft.com/office/drawing/2014/main" id="{29ACBD31-580B-434C-89DC-C0029CBC79B9}"/>
+                </a:ext>
+              </a:extLst>
+            </p:cNvPr>
+            <p:cNvSpPr txBox="1"/>
+            <p:nvPr/>
+          </p:nvSpPr>
+          <p:spPr>
+            <a:xfrm>
+              <a:off x="2544305" y="1956890"/>
+              <a:ext cx="295275" cy="835881"/>
+            </a:xfrm>
+            <a:prstGeom prst="rect">
+              <a:avLst/>
+            </a:prstGeom>
+            <a:noFill/>
+          </p:spPr>
+          <p:txBody>
+            <a:bodyPr wrap="square" rtlCol="0">
+              <a:spAutoFit/>
+            </a:bodyPr>
+            <a:lstStyle/>
+            <a:p>
+              <a:endParaRPr lang="en-GB" sz="2400" i="1" dirty="0"/>
+            </a:p>
+          </p:txBody>
+        </p:sp>
+        <p:sp>
+          <p:nvSpPr>
+            <p:cNvPr id="39" name="TextBox 38">
+              <a:extLst>
+                <a:ext uri="{FF2B5EF4-FFF2-40B4-BE49-F238E27FC236}">
+                  <a16:creationId xmlns:a16="http://schemas.microsoft.com/office/drawing/2014/main" id="{12517884-3DD8-4E8F-B5AC-D76A087D01D8}"/>
+                </a:ext>
+              </a:extLst>
+            </p:cNvPr>
+            <p:cNvSpPr txBox="1"/>
+            <p:nvPr/>
+          </p:nvSpPr>
+          <p:spPr>
+            <a:xfrm>
+              <a:off x="2533085" y="3018553"/>
+              <a:ext cx="334470" cy="835881"/>
+            </a:xfrm>
+            <a:prstGeom prst="rect">
+              <a:avLst/>
+            </a:prstGeom>
+            <a:noFill/>
+          </p:spPr>
+          <p:txBody>
+            <a:bodyPr wrap="none" rtlCol="0">
+              <a:spAutoFit/>
+            </a:bodyPr>
+            <a:lstStyle/>
+            <a:p>
+              <a:endParaRPr lang="en-GB" sz="2400" i="1" dirty="0"/>
+            </a:p>
+          </p:txBody>
+        </p:sp>
+        <p:sp>
+          <p:nvSpPr>
+            <p:cNvPr id="40" name="TextBox 39">
+              <a:extLst>
+                <a:ext uri="{FF2B5EF4-FFF2-40B4-BE49-F238E27FC236}">
+                  <a16:creationId xmlns:a16="http://schemas.microsoft.com/office/drawing/2014/main" id="{2D6F9F08-7360-47FC-A72C-8A3FA4483E6D}"/>
+                </a:ext>
+              </a:extLst>
+            </p:cNvPr>
+            <p:cNvSpPr txBox="1"/>
+            <p:nvPr/>
+          </p:nvSpPr>
+          <p:spPr>
+            <a:xfrm>
+              <a:off x="3389449" y="451872"/>
+              <a:ext cx="334470" cy="835881"/>
+            </a:xfrm>
+            <a:prstGeom prst="rect">
+              <a:avLst/>
+            </a:prstGeom>
+            <a:noFill/>
+          </p:spPr>
+          <p:txBody>
+            <a:bodyPr wrap="none" rtlCol="0">
+              <a:spAutoFit/>
+            </a:bodyPr>
+            <a:lstStyle/>
+            <a:p>
+              <a:endParaRPr lang="en-GB" sz="2400" i="1" dirty="0"/>
+            </a:p>
+          </p:txBody>
+        </p:sp>
+      </p:grpSp>
+      <p:grpSp>
+        <p:nvGrpSpPr>
+          <p:cNvPr id="41" name="Group 40">
+            <a:extLst>
+              <a:ext uri="{FF2B5EF4-FFF2-40B4-BE49-F238E27FC236}">
+                <a16:creationId xmlns:a16="http://schemas.microsoft.com/office/drawing/2014/main" id="{616550D2-9134-4052-8498-A1DDC2A29824}"/>
+              </a:ext>
+            </a:extLst>
+          </p:cNvPr>
+          <p:cNvGrpSpPr/>
+          <p:nvPr/>
+        </p:nvGrpSpPr>
+        <p:grpSpPr>
+          <a:xfrm>
+            <a:off x="2653982" y="1418505"/>
+            <a:ext cx="2340310" cy="2461837"/>
+            <a:chOff x="615052" y="381480"/>
+            <a:chExt cx="4237315" cy="4457349"/>
+          </a:xfrm>
+        </p:grpSpPr>
+        <p:sp>
+          <p:nvSpPr>
+            <p:cNvPr id="42" name="Oval 41">
+              <a:extLst>
+                <a:ext uri="{FF2B5EF4-FFF2-40B4-BE49-F238E27FC236}">
+                  <a16:creationId xmlns:a16="http://schemas.microsoft.com/office/drawing/2014/main" id="{AFA82D23-43F7-41E1-9E00-6C85E0447719}"/>
+                </a:ext>
+              </a:extLst>
+            </p:cNvPr>
+            <p:cNvSpPr/>
+            <p:nvPr/>
+          </p:nvSpPr>
+          <p:spPr>
+            <a:xfrm>
+              <a:off x="2226612" y="381480"/>
+              <a:ext cx="2625755" cy="2625755"/>
+            </a:xfrm>
+            <a:prstGeom prst="ellipse">
+              <a:avLst/>
+            </a:prstGeom>
+            <a:solidFill>
+              <a:srgbClr val="FFFF00">
+                <a:alpha val="50196"/>
+              </a:srgbClr>
+            </a:solidFill>
+          </p:spPr>
+          <p:style>
+            <a:lnRef idx="2">
+              <a:schemeClr val="accent1">
+                <a:shade val="50000"/>
+              </a:schemeClr>
+            </a:lnRef>
+            <a:fillRef idx="1">
+              <a:schemeClr val="accent1"/>
+            </a:fillRef>
+            <a:effectRef idx="0">
+              <a:schemeClr val="accent1"/>
+            </a:effectRef>
+            <a:fontRef idx="minor">
+              <a:schemeClr val="lt1"/>
+            </a:fontRef>
+          </p:style>
+          <p:txBody>
+            <a:bodyPr rtlCol="0" anchor="ctr"/>
+            <a:lstStyle/>
+            <a:p>
+              <a:pPr algn="ctr"/>
+              <a:r>
+                <a:rPr lang="en-GB" sz="2400" b="1" dirty="0">
+                  <a:solidFill>
+                    <a:schemeClr val="accent4"/>
+                  </a:solidFill>
+                </a:rPr>
+                <a:t>Y</a:t>
+              </a:r>
+            </a:p>
+          </p:txBody>
+        </p:sp>
+        <p:sp>
+          <p:nvSpPr>
+            <p:cNvPr id="43" name="Oval 42">
+              <a:extLst>
+                <a:ext uri="{FF2B5EF4-FFF2-40B4-BE49-F238E27FC236}">
+                  <a16:creationId xmlns:a16="http://schemas.microsoft.com/office/drawing/2014/main" id="{77777D28-1BE1-4780-B140-EC3AAF979A69}"/>
+                </a:ext>
+              </a:extLst>
+            </p:cNvPr>
+            <p:cNvSpPr/>
+            <p:nvPr/>
+          </p:nvSpPr>
+          <p:spPr>
+            <a:xfrm>
+              <a:off x="2226613" y="2213075"/>
+              <a:ext cx="2625754" cy="2625754"/>
+            </a:xfrm>
+            <a:prstGeom prst="ellipse">
+              <a:avLst/>
+            </a:prstGeom>
+            <a:solidFill>
+              <a:srgbClr val="FF0000">
+                <a:alpha val="50196"/>
+              </a:srgbClr>
+            </a:solidFill>
+          </p:spPr>
+          <p:style>
+            <a:lnRef idx="2">
+              <a:schemeClr val="accent1">
+                <a:shade val="50000"/>
+              </a:schemeClr>
+            </a:lnRef>
+            <a:fillRef idx="1">
+              <a:schemeClr val="accent1"/>
+            </a:fillRef>
+            <a:effectRef idx="0">
+              <a:schemeClr val="accent1"/>
+            </a:effectRef>
+            <a:fontRef idx="minor">
+              <a:schemeClr val="lt1"/>
+            </a:fontRef>
+          </p:style>
+          <p:txBody>
+            <a:bodyPr rtlCol="0" anchor="ctr"/>
+            <a:lstStyle/>
+            <a:p>
+              <a:pPr algn="ctr"/>
+              <a:r>
+                <a:rPr lang="en-GB" sz="2400" b="1" dirty="0">
+                  <a:solidFill>
+                    <a:srgbClr val="C00000"/>
+                  </a:solidFill>
+                </a:rPr>
+                <a:t>X</a:t>
+              </a:r>
+            </a:p>
+          </p:txBody>
+        </p:sp>
+        <p:sp>
+          <p:nvSpPr>
+            <p:cNvPr id="44" name="Oval 43">
+              <a:extLst>
+                <a:ext uri="{FF2B5EF4-FFF2-40B4-BE49-F238E27FC236}">
+                  <a16:creationId xmlns:a16="http://schemas.microsoft.com/office/drawing/2014/main" id="{ACB35C50-35E4-43A4-8D92-A68E0550CFE6}"/>
+                </a:ext>
+              </a:extLst>
+            </p:cNvPr>
+            <p:cNvSpPr/>
+            <p:nvPr/>
+          </p:nvSpPr>
+          <p:spPr>
+            <a:xfrm>
+              <a:off x="615052" y="1387460"/>
+              <a:ext cx="2625754" cy="2625754"/>
+            </a:xfrm>
+            <a:prstGeom prst="ellipse">
+              <a:avLst/>
+            </a:prstGeom>
+            <a:solidFill>
+              <a:srgbClr val="00B0F0">
+                <a:alpha val="50196"/>
+              </a:srgbClr>
+            </a:solidFill>
+          </p:spPr>
+          <p:style>
+            <a:lnRef idx="2">
+              <a:schemeClr val="accent1">
+                <a:shade val="50000"/>
+              </a:schemeClr>
+            </a:lnRef>
+            <a:fillRef idx="1">
+              <a:schemeClr val="accent1"/>
+            </a:fillRef>
+            <a:effectRef idx="0">
+              <a:schemeClr val="accent1"/>
+            </a:effectRef>
+            <a:fontRef idx="minor">
+              <a:schemeClr val="lt1"/>
+            </a:fontRef>
+          </p:style>
+          <p:txBody>
+            <a:bodyPr rtlCol="0" anchor="ctr"/>
+            <a:lstStyle/>
+            <a:p>
+              <a:pPr algn="ctr"/>
+              <a:r>
+                <a:rPr lang="en-GB" sz="2400" b="1" dirty="0">
+                  <a:solidFill>
+                    <a:schemeClr val="accent1"/>
+                  </a:solidFill>
+                </a:rPr>
+                <a:t>Z</a:t>
+              </a:r>
+            </a:p>
+          </p:txBody>
+        </p:sp>
+        <p:sp>
+          <p:nvSpPr>
+            <p:cNvPr id="45" name="TextBox 44">
+              <a:extLst>
+                <a:ext uri="{FF2B5EF4-FFF2-40B4-BE49-F238E27FC236}">
+                  <a16:creationId xmlns:a16="http://schemas.microsoft.com/office/drawing/2014/main" id="{0D6BC9C8-11F2-4632-84D3-DA38C0D1134F}"/>
+                </a:ext>
+              </a:extLst>
+            </p:cNvPr>
+            <p:cNvSpPr txBox="1"/>
+            <p:nvPr/>
+          </p:nvSpPr>
+          <p:spPr>
+            <a:xfrm>
+              <a:off x="3391853" y="2450767"/>
+              <a:ext cx="334470" cy="835881"/>
+            </a:xfrm>
+            <a:prstGeom prst="rect">
+              <a:avLst/>
+            </a:prstGeom>
+            <a:noFill/>
+          </p:spPr>
+          <p:txBody>
+            <a:bodyPr wrap="none" rtlCol="0">
+              <a:spAutoFit/>
+            </a:bodyPr>
+            <a:lstStyle/>
+            <a:p>
+              <a:endParaRPr lang="en-GB" sz="2400" i="1" dirty="0"/>
+            </a:p>
+          </p:txBody>
+        </p:sp>
+        <p:sp>
+          <p:nvSpPr>
+            <p:cNvPr id="46" name="TextBox 45">
+              <a:extLst>
+                <a:ext uri="{FF2B5EF4-FFF2-40B4-BE49-F238E27FC236}">
+                  <a16:creationId xmlns:a16="http://schemas.microsoft.com/office/drawing/2014/main" id="{4EF7DB32-BB2D-4323-8C5F-42958A627F35}"/>
+                </a:ext>
+              </a:extLst>
+            </p:cNvPr>
+            <p:cNvSpPr txBox="1"/>
+            <p:nvPr/>
+          </p:nvSpPr>
+          <p:spPr>
+            <a:xfrm>
+              <a:off x="2839578" y="2389728"/>
+              <a:ext cx="334470" cy="835881"/>
+            </a:xfrm>
+            <a:prstGeom prst="rect">
+              <a:avLst/>
+            </a:prstGeom>
+            <a:noFill/>
+          </p:spPr>
+          <p:txBody>
+            <a:bodyPr wrap="none" rtlCol="0">
+              <a:spAutoFit/>
+            </a:bodyPr>
+            <a:lstStyle/>
+            <a:p>
+              <a:endParaRPr lang="en-GB" sz="2400" i="1" dirty="0"/>
+            </a:p>
+          </p:txBody>
+        </p:sp>
+        <p:sp>
+          <p:nvSpPr>
+            <p:cNvPr id="47" name="TextBox 46">
+              <a:extLst>
+                <a:ext uri="{FF2B5EF4-FFF2-40B4-BE49-F238E27FC236}">
+                  <a16:creationId xmlns:a16="http://schemas.microsoft.com/office/drawing/2014/main" id="{376F799C-49BF-455D-9BE2-B93DC014ABBB}"/>
+                </a:ext>
+              </a:extLst>
+            </p:cNvPr>
+            <p:cNvSpPr txBox="1"/>
+            <p:nvPr/>
+          </p:nvSpPr>
+          <p:spPr>
+            <a:xfrm>
+              <a:off x="2544305" y="1956890"/>
+              <a:ext cx="295275" cy="835881"/>
+            </a:xfrm>
+            <a:prstGeom prst="rect">
+              <a:avLst/>
+            </a:prstGeom>
+            <a:noFill/>
+          </p:spPr>
+          <p:txBody>
+            <a:bodyPr wrap="square" rtlCol="0">
+              <a:spAutoFit/>
+            </a:bodyPr>
+            <a:lstStyle/>
+            <a:p>
+              <a:endParaRPr lang="en-GB" sz="2400" i="1" dirty="0"/>
+            </a:p>
+          </p:txBody>
+        </p:sp>
+        <p:sp>
+          <p:nvSpPr>
+            <p:cNvPr id="48" name="TextBox 47">
+              <a:extLst>
+                <a:ext uri="{FF2B5EF4-FFF2-40B4-BE49-F238E27FC236}">
+                  <a16:creationId xmlns:a16="http://schemas.microsoft.com/office/drawing/2014/main" id="{FBFB94FA-195D-4DFE-87AE-19A8D97F6BA4}"/>
+                </a:ext>
+              </a:extLst>
+            </p:cNvPr>
+            <p:cNvSpPr txBox="1"/>
+            <p:nvPr/>
+          </p:nvSpPr>
+          <p:spPr>
+            <a:xfrm>
+              <a:off x="2533085" y="3018553"/>
+              <a:ext cx="334470" cy="835881"/>
+            </a:xfrm>
+            <a:prstGeom prst="rect">
+              <a:avLst/>
+            </a:prstGeom>
+            <a:noFill/>
+          </p:spPr>
+          <p:txBody>
+            <a:bodyPr wrap="none" rtlCol="0">
+              <a:spAutoFit/>
+            </a:bodyPr>
+            <a:lstStyle/>
+            <a:p>
+              <a:endParaRPr lang="en-GB" sz="2400" i="1" dirty="0"/>
+            </a:p>
+          </p:txBody>
+        </p:sp>
+        <p:sp>
+          <p:nvSpPr>
+            <p:cNvPr id="49" name="TextBox 48">
+              <a:extLst>
+                <a:ext uri="{FF2B5EF4-FFF2-40B4-BE49-F238E27FC236}">
+                  <a16:creationId xmlns:a16="http://schemas.microsoft.com/office/drawing/2014/main" id="{C3A67F79-8ED7-4A5C-93C5-0184BBE19F3F}"/>
+                </a:ext>
+              </a:extLst>
+            </p:cNvPr>
+            <p:cNvSpPr txBox="1"/>
+            <p:nvPr/>
+          </p:nvSpPr>
+          <p:spPr>
+            <a:xfrm>
+              <a:off x="3389449" y="451872"/>
+              <a:ext cx="334470" cy="835881"/>
+            </a:xfrm>
+            <a:prstGeom prst="rect">
+              <a:avLst/>
+            </a:prstGeom>
+            <a:noFill/>
+          </p:spPr>
+          <p:txBody>
+            <a:bodyPr wrap="none" rtlCol="0">
+              <a:spAutoFit/>
+            </a:bodyPr>
+            <a:lstStyle/>
+            <a:p>
+              <a:endParaRPr lang="en-GB" sz="2400" i="1" dirty="0"/>
+            </a:p>
+          </p:txBody>
+        </p:sp>
+      </p:grpSp>
+    </p:spTree>
+    <p:extLst>
+      <p:ext uri="{BB962C8B-B14F-4D97-AF65-F5344CB8AC3E}">
+        <p14:creationId xmlns:p14="http://schemas.microsoft.com/office/powerpoint/2010/main" val="1261830625"/>
+      </p:ext>
+    </p:extLst>
+  </p:cSld>
+  <p:clrMapOvr>
+    <a:masterClrMapping/>
+  </p:clrMapOvr>
+</p:sld>
+</file>
+
 <file path=ppt/slides/slide2.xml><?xml version="1.0" encoding="utf-8"?>
 <p:sld xmlns:a="http://schemas.openxmlformats.org/drawingml/2006/main" xmlns:r="http://schemas.openxmlformats.org/officeDocument/2006/relationships" xmlns:p="http://schemas.openxmlformats.org/presentationml/2006/main">
   <p:cSld>
@@ -3178,7 +4158,7 @@
                   <a:srgbClr val="C00000"/>
                 </a:solidFill>
               </a:rPr>
-              <a:t>X1</a:t>
+              <a:t>X</a:t>
             </a:r>
           </a:p>
         </p:txBody>
@@ -3344,7 +4324,7 @@
                     <a:srgbClr val="C00000"/>
                   </a:solidFill>
                 </a:rPr>
-                <a:t>X1</a:t>
+                <a:t>X</a:t>
               </a:r>
             </a:p>
           </p:txBody>
@@ -3581,7 +4561,7 @@
                     <a:srgbClr val="C00000"/>
                   </a:solidFill>
                 </a:rPr>
-                <a:t>X1</a:t>
+                <a:t>X</a:t>
               </a:r>
             </a:p>
           </p:txBody>
@@ -3639,7 +4619,7 @@
                     <a:schemeClr val="accent1"/>
                   </a:solidFill>
                 </a:rPr>
-                <a:t>X2</a:t>
+                <a:t>Z</a:t>
               </a:r>
             </a:p>
           </p:txBody>
@@ -3911,7 +4891,7 @@
                     <a:srgbClr val="C00000"/>
                   </a:solidFill>
                 </a:rPr>
-                <a:t>X1</a:t>
+                <a:t>X</a:t>
               </a:r>
             </a:p>
           </p:txBody>
@@ -3969,7 +4949,7 @@
                     <a:schemeClr val="accent1"/>
                   </a:solidFill>
                 </a:rPr>
-                <a:t>X2</a:t>
+                <a:t>Z</a:t>
               </a:r>
             </a:p>
           </p:txBody>
@@ -4557,7 +5537,7 @@
                   <a:srgbClr val="C00000"/>
                 </a:solidFill>
               </a:rPr>
-              <a:t>X1</a:t>
+              <a:t> X</a:t>
             </a:r>
             <a:endParaRPr lang="en-GB" sz="3200" dirty="0">
               <a:solidFill>
@@ -4601,7 +5581,7 @@
                   <a:schemeClr val="accent1"/>
                 </a:solidFill>
               </a:rPr>
-              <a:t>X2</a:t>
+              <a:t>Z</a:t>
             </a:r>
             <a:endParaRPr lang="en-GB" sz="3200" dirty="0">
               <a:solidFill>
@@ -4706,7 +5686,6 @@
             <a:avLst/>
           </a:prstGeom>
           <a:noFill/>
-          <a:ln w="19050"/>
         </p:spPr>
         <p:style>
           <a:lnRef idx="2">
@@ -4761,7 +5740,6 @@
             <a:avLst/>
           </a:prstGeom>
           <a:noFill/>
-          <a:ln w="19050"/>
         </p:spPr>
         <p:style>
           <a:lnRef idx="2">
@@ -4813,7 +5791,6 @@
             <a:avLst/>
           </a:prstGeom>
           <a:noFill/>
-          <a:ln w="19050"/>
         </p:spPr>
         <p:style>
           <a:lnRef idx="2">
@@ -4865,7 +5842,6 @@
             <a:avLst/>
           </a:prstGeom>
           <a:noFill/>
-          <a:ln w="19050"/>
         </p:spPr>
         <p:style>
           <a:lnRef idx="2">
@@ -4917,9 +5893,6 @@
             <a:avLst/>
           </a:prstGeom>
           <a:noFill/>
-          <a:ln w="19050">
-            <a:noFill/>
-          </a:ln>
         </p:spPr>
         <p:txBody>
           <a:bodyPr wrap="square">
@@ -4934,7 +5907,7 @@
                   <a:srgbClr val="00B050"/>
                 </a:solidFill>
               </a:rPr>
-              <a:t>X3</a:t>
+              <a:t>Z2</a:t>
             </a:r>
           </a:p>
         </p:txBody>
@@ -4960,9 +5933,6 @@
             <a:avLst/>
           </a:prstGeom>
           <a:noFill/>
-          <a:ln w="19050">
-            <a:noFill/>
-          </a:ln>
         </p:spPr>
         <p:txBody>
           <a:bodyPr wrap="square">
@@ -4977,7 +5947,7 @@
                   <a:schemeClr val="accent1"/>
                 </a:solidFill>
               </a:rPr>
-              <a:t>X2</a:t>
+              <a:t>Z</a:t>
             </a:r>
           </a:p>
         </p:txBody>
@@ -5003,9 +5973,6 @@
             <a:avLst/>
           </a:prstGeom>
           <a:noFill/>
-          <a:ln w="19050">
-            <a:noFill/>
-          </a:ln>
         </p:spPr>
         <p:txBody>
           <a:bodyPr wrap="square">
@@ -5020,7 +5987,7 @@
                   <a:srgbClr val="C00000"/>
                 </a:solidFill>
               </a:rPr>
-              <a:t>X1</a:t>
+              <a:t>X</a:t>
             </a:r>
           </a:p>
         </p:txBody>
@@ -5076,7 +6043,6 @@
             <a:avLst/>
           </a:prstGeom>
           <a:noFill/>
-          <a:ln w="19050"/>
         </p:spPr>
         <p:style>
           <a:lnRef idx="2">
@@ -5131,7 +6097,6 @@
             <a:avLst/>
           </a:prstGeom>
           <a:noFill/>
-          <a:ln w="19050"/>
         </p:spPr>
         <p:style>
           <a:lnRef idx="2">
@@ -5183,9 +6148,6 @@
             <a:avLst/>
           </a:prstGeom>
           <a:noFill/>
-          <a:ln w="19050">
-            <a:noFill/>
-          </a:ln>
         </p:spPr>
         <p:txBody>
           <a:bodyPr wrap="square">
@@ -5200,7 +6162,7 @@
                   <a:srgbClr val="C00000"/>
                 </a:solidFill>
               </a:rPr>
-              <a:t>X1</a:t>
+              <a:t>X</a:t>
             </a:r>
           </a:p>
         </p:txBody>
@@ -5256,7 +6218,6 @@
             <a:avLst/>
           </a:prstGeom>
           <a:noFill/>
-          <a:ln w="19050"/>
         </p:spPr>
         <p:style>
           <a:lnRef idx="2">
@@ -5292,6 +6253,97 @@
       </p:sp>
       <p:sp>
         <p:nvSpPr>
+          <p:cNvPr id="14" name="Oval 13">
+            <a:extLst>
+              <a:ext uri="{FF2B5EF4-FFF2-40B4-BE49-F238E27FC236}">
+                <a16:creationId xmlns:a16="http://schemas.microsoft.com/office/drawing/2014/main" id="{269EEE0F-EF3E-4A4F-8A1A-E39A2F99F711}"/>
+              </a:ext>
+            </a:extLst>
+          </p:cNvPr>
+          <p:cNvSpPr/>
+          <p:nvPr/>
+        </p:nvSpPr>
+        <p:spPr>
+          <a:xfrm rot="19977969">
+            <a:off x="3227557" y="1988194"/>
+            <a:ext cx="2026725" cy="2625755"/>
+          </a:xfrm>
+          <a:prstGeom prst="ellipse">
+            <a:avLst/>
+          </a:prstGeom>
+          <a:noFill/>
+        </p:spPr>
+        <p:style>
+          <a:lnRef idx="2">
+            <a:schemeClr val="accent1">
+              <a:shade val="50000"/>
+            </a:schemeClr>
+          </a:lnRef>
+          <a:fillRef idx="1">
+            <a:schemeClr val="accent1"/>
+          </a:fillRef>
+          <a:effectRef idx="0">
+            <a:schemeClr val="accent1"/>
+          </a:effectRef>
+          <a:fontRef idx="minor">
+            <a:schemeClr val="lt1"/>
+          </a:fontRef>
+        </p:style>
+        <p:txBody>
+          <a:bodyPr rtlCol="0" anchor="ctr"/>
+          <a:lstStyle/>
+          <a:p>
+            <a:pPr algn="ctr"/>
+            <a:endParaRPr lang="en-GB" sz="3200" b="1" dirty="0">
+              <a:solidFill>
+                <a:srgbClr val="C00000"/>
+              </a:solidFill>
+            </a:endParaRPr>
+          </a:p>
+        </p:txBody>
+      </p:sp>
+      <p:sp>
+        <p:nvSpPr>
+          <p:cNvPr id="20" name="TextBox 19">
+            <a:extLst>
+              <a:ext uri="{FF2B5EF4-FFF2-40B4-BE49-F238E27FC236}">
+                <a16:creationId xmlns:a16="http://schemas.microsoft.com/office/drawing/2014/main" id="{6CAD6159-BD20-4430-8BC3-61794086647C}"/>
+              </a:ext>
+            </a:extLst>
+          </p:cNvPr>
+          <p:cNvSpPr txBox="1"/>
+          <p:nvPr/>
+        </p:nvSpPr>
+        <p:spPr>
+          <a:xfrm>
+            <a:off x="4251675" y="3712030"/>
+            <a:ext cx="765893" cy="584775"/>
+          </a:xfrm>
+          <a:prstGeom prst="rect">
+            <a:avLst/>
+          </a:prstGeom>
+          <a:noFill/>
+        </p:spPr>
+        <p:txBody>
+          <a:bodyPr wrap="square">
+            <a:spAutoFit/>
+          </a:bodyPr>
+          <a:lstStyle/>
+          <a:p>
+            <a:pPr algn="ctr"/>
+            <a:r>
+              <a:rPr lang="en-GB" sz="3200" b="1" dirty="0">
+                <a:solidFill>
+                  <a:srgbClr val="C00000"/>
+                </a:solidFill>
+              </a:rPr>
+              <a:t>X</a:t>
+            </a:r>
+          </a:p>
+        </p:txBody>
+      </p:sp>
+      <p:sp>
+        <p:nvSpPr>
           <p:cNvPr id="7" name="Oval 6">
             <a:extLst>
               <a:ext uri="{FF2B5EF4-FFF2-40B4-BE49-F238E27FC236}">
@@ -5304,14 +6356,14 @@
         </p:nvSpPr>
         <p:spPr>
           <a:xfrm>
-            <a:off x="2226613" y="2182276"/>
+            <a:off x="1336409" y="1768460"/>
             <a:ext cx="2625754" cy="2625754"/>
           </a:xfrm>
           <a:prstGeom prst="ellipse">
             <a:avLst/>
           </a:prstGeom>
           <a:noFill/>
-          <a:ln w="19050">
+          <a:ln>
             <a:prstDash val="sysDash"/>
           </a:ln>
         </p:spPr>

</xml_diff>